<commit_message>
adding CI for seroprevalence
</commit_message>
<xml_diff>
--- a/Lecture 3/Lecture 3 draft v2.pptx
+++ b/Lecture 3/Lecture 3 draft v2.pptx
@@ -5,7 +5,7 @@
     <p:sldMasterId id="2147483672" r:id="rId1"/>
   </p:sldMasterIdLst>
   <p:notesMasterIdLst>
-    <p:notesMasterId r:id="rId28"/>
+    <p:notesMasterId r:id="rId30"/>
   </p:notesMasterIdLst>
   <p:sldIdLst>
     <p:sldId id="262" r:id="rId2"/>
@@ -22,18 +22,20 @@
     <p:sldId id="301" r:id="rId13"/>
     <p:sldId id="264" r:id="rId14"/>
     <p:sldId id="306" r:id="rId15"/>
-    <p:sldId id="285" r:id="rId16"/>
-    <p:sldId id="265" r:id="rId17"/>
-    <p:sldId id="305" r:id="rId18"/>
-    <p:sldId id="267" r:id="rId19"/>
-    <p:sldId id="308" r:id="rId20"/>
-    <p:sldId id="268" r:id="rId21"/>
-    <p:sldId id="289" r:id="rId22"/>
-    <p:sldId id="269" r:id="rId23"/>
-    <p:sldId id="291" r:id="rId24"/>
-    <p:sldId id="295" r:id="rId25"/>
-    <p:sldId id="296" r:id="rId26"/>
-    <p:sldId id="307" r:id="rId27"/>
+    <p:sldId id="309" r:id="rId16"/>
+    <p:sldId id="310" r:id="rId17"/>
+    <p:sldId id="285" r:id="rId18"/>
+    <p:sldId id="265" r:id="rId19"/>
+    <p:sldId id="305" r:id="rId20"/>
+    <p:sldId id="267" r:id="rId21"/>
+    <p:sldId id="308" r:id="rId22"/>
+    <p:sldId id="268" r:id="rId23"/>
+    <p:sldId id="289" r:id="rId24"/>
+    <p:sldId id="269" r:id="rId25"/>
+    <p:sldId id="291" r:id="rId26"/>
+    <p:sldId id="295" r:id="rId27"/>
+    <p:sldId id="296" r:id="rId28"/>
+    <p:sldId id="307" r:id="rId29"/>
   </p:sldIdLst>
   <p:sldSz cx="12192000" cy="6858000"/>
   <p:notesSz cx="6858000" cy="9144000"/>
@@ -163,6 +165,8 @@
             <p14:sldId id="301"/>
             <p14:sldId id="264"/>
             <p14:sldId id="306"/>
+            <p14:sldId id="309"/>
+            <p14:sldId id="310"/>
             <p14:sldId id="285"/>
             <p14:sldId id="265"/>
             <p14:sldId id="305"/>
@@ -1688,7 +1692,7 @@
           <a:p>
             <a:fld id="{996BBC3D-3E8B-F74A-BA84-000B911EA6F4}" type="slidenum">
               <a:rPr lang="en-US" smtClean="0"/>
-              <a:t>15</a:t>
+              <a:t>17</a:t>
             </a:fld>
             <a:endParaRPr lang="en-US"/>
           </a:p>
@@ -1865,7 +1869,7 @@
           <a:p>
             <a:fld id="{996BBC3D-3E8B-F74A-BA84-000B911EA6F4}" type="slidenum">
               <a:rPr lang="en-US" smtClean="0"/>
-              <a:t>16</a:t>
+              <a:t>18</a:t>
             </a:fld>
             <a:endParaRPr lang="en-US"/>
           </a:p>
@@ -2020,7 +2024,7 @@
           <a:p>
             <a:fld id="{996BBC3D-3E8B-F74A-BA84-000B911EA6F4}" type="slidenum">
               <a:rPr lang="en-US" smtClean="0"/>
-              <a:t>18</a:t>
+              <a:t>20</a:t>
             </a:fld>
             <a:endParaRPr lang="en-US"/>
           </a:p>
@@ -2104,7 +2108,7 @@
           <a:p>
             <a:fld id="{A7294D4A-3C6D-3543-B453-E3C017326446}" type="slidenum">
               <a:rPr lang="en-US" smtClean="0"/>
-              <a:t>20</a:t>
+              <a:t>22</a:t>
             </a:fld>
             <a:endParaRPr lang="en-US"/>
           </a:p>
@@ -2281,7 +2285,7 @@
           <a:p>
             <a:fld id="{A7294D4A-3C6D-3543-B453-E3C017326446}" type="slidenum">
               <a:rPr lang="en-US" smtClean="0"/>
-              <a:t>24</a:t>
+              <a:t>26</a:t>
             </a:fld>
             <a:endParaRPr lang="en-US"/>
           </a:p>
@@ -6742,6 +6746,330 @@
   <p:cSld>
     <p:spTree>
       <p:nvGrpSpPr>
+        <p:cNvPr id="1" name=""/>
+        <p:cNvGrpSpPr/>
+        <p:nvPr/>
+      </p:nvGrpSpPr>
+      <p:grpSpPr>
+        <a:xfrm>
+          <a:off x="0" y="0"/>
+          <a:ext cx="0" cy="0"/>
+          <a:chOff x="0" y="0"/>
+          <a:chExt cx="0" cy="0"/>
+        </a:xfrm>
+      </p:grpSpPr>
+      <p:sp>
+        <p:nvSpPr>
+          <p:cNvPr id="2" name="Title 1">
+            <a:extLst>
+              <a:ext uri="{FF2B5EF4-FFF2-40B4-BE49-F238E27FC236}">
+                <a16:creationId xmlns:a16="http://schemas.microsoft.com/office/drawing/2014/main" id="{947C34EA-3998-CF35-65B3-87AD2E3C73D6}"/>
+              </a:ext>
+            </a:extLst>
+          </p:cNvPr>
+          <p:cNvSpPr>
+            <a:spLocks noGrp="1"/>
+          </p:cNvSpPr>
+          <p:nvPr>
+            <p:ph type="title"/>
+          </p:nvPr>
+        </p:nvSpPr>
+        <p:spPr/>
+        <p:txBody>
+          <a:bodyPr/>
+          <a:lstStyle/>
+          <a:p>
+            <a:r>
+              <a:rPr lang="en-US" dirty="0"/>
+              <a:t>Calculating seropositivity – confidence intervals</a:t>
+            </a:r>
+          </a:p>
+        </p:txBody>
+      </p:sp>
+      <p:sp>
+        <p:nvSpPr>
+          <p:cNvPr id="3" name="Content Placeholder 2">
+            <a:extLst>
+              <a:ext uri="{FF2B5EF4-FFF2-40B4-BE49-F238E27FC236}">
+                <a16:creationId xmlns:a16="http://schemas.microsoft.com/office/drawing/2014/main" id="{BDC9B94E-699B-165F-04D9-613EE637E3F0}"/>
+              </a:ext>
+            </a:extLst>
+          </p:cNvPr>
+          <p:cNvSpPr>
+            <a:spLocks noGrp="1"/>
+          </p:cNvSpPr>
+          <p:nvPr>
+            <p:ph idx="1"/>
+          </p:nvPr>
+        </p:nvSpPr>
+        <p:spPr/>
+        <p:txBody>
+          <a:bodyPr>
+            <a:normAutofit/>
+          </a:bodyPr>
+          <a:lstStyle/>
+          <a:p>
+            <a:r>
+              <a:rPr lang="en-US" dirty="0"/>
+              <a:t>A confidence interval of 95% accounts for number of people sampled to make a seropositivity range that we are 95% confident will include the true population level seroprevalence</a:t>
+            </a:r>
+          </a:p>
+          <a:p>
+            <a:r>
+              <a:rPr lang="en-US" dirty="0"/>
+              <a:t>This method is based on a binomial distribution, and though the equation is complicated, but we can use R to easily compute it.</a:t>
+            </a:r>
+          </a:p>
+          <a:p>
+            <a:endParaRPr lang="en-US" dirty="0"/>
+          </a:p>
+          <a:p>
+            <a:endParaRPr lang="en-US" dirty="0"/>
+          </a:p>
+          <a:p>
+            <a:pPr marL="0" indent="0">
+              <a:buNone/>
+            </a:pPr>
+            <a:r>
+              <a:rPr lang="en-US" dirty="0"/>
+              <a:t>With 767 positives and 1000 total, lower 95% CI is: 74.0% and upper 95% CI is: 79.3%</a:t>
+            </a:r>
+          </a:p>
+        </p:txBody>
+      </p:sp>
+      <p:pic>
+        <p:nvPicPr>
+          <p:cNvPr id="6" name="Picture 5">
+            <a:extLst>
+              <a:ext uri="{FF2B5EF4-FFF2-40B4-BE49-F238E27FC236}">
+                <a16:creationId xmlns:a16="http://schemas.microsoft.com/office/drawing/2014/main" id="{7BAF375D-9085-B808-5846-BFA1DBE11679}"/>
+              </a:ext>
+            </a:extLst>
+          </p:cNvPr>
+          <p:cNvPicPr>
+            <a:picLocks noChangeAspect="1"/>
+          </p:cNvPicPr>
+          <p:nvPr/>
+        </p:nvPicPr>
+        <p:blipFill>
+          <a:blip r:embed="rId2"/>
+          <a:stretch>
+            <a:fillRect/>
+          </a:stretch>
+        </p:blipFill>
+        <p:spPr>
+          <a:xfrm>
+            <a:off x="4067174" y="4067969"/>
+            <a:ext cx="4219575" cy="932628"/>
+          </a:xfrm>
+          <a:prstGeom prst="rect">
+            <a:avLst/>
+          </a:prstGeom>
+        </p:spPr>
+      </p:pic>
+    </p:spTree>
+    <p:extLst>
+      <p:ext uri="{BB962C8B-B14F-4D97-AF65-F5344CB8AC3E}">
+        <p14:creationId xmlns:p14="http://schemas.microsoft.com/office/powerpoint/2010/main" val="980664946"/>
+      </p:ext>
+    </p:extLst>
+  </p:cSld>
+  <p:clrMapOvr>
+    <a:masterClrMapping/>
+  </p:clrMapOvr>
+  <p:timing>
+    <p:tnLst>
+      <p:par>
+        <p:cTn id="1" dur="indefinite" restart="never" nodeType="tmRoot">
+          <p:childTnLst>
+            <p:seq concurrent="1" nextAc="seek">
+              <p:cTn id="2" dur="indefinite" nodeType="mainSeq">
+                <p:childTnLst>
+                  <p:par>
+                    <p:cTn id="3" fill="hold">
+                      <p:stCondLst>
+                        <p:cond delay="indefinite"/>
+                      </p:stCondLst>
+                      <p:childTnLst>
+                        <p:par>
+                          <p:cTn id="4" fill="hold">
+                            <p:stCondLst>
+                              <p:cond delay="0"/>
+                            </p:stCondLst>
+                            <p:childTnLst>
+                              <p:par>
+                                <p:cTn id="5" presetID="1" presetClass="entr" presetSubtype="0" fill="hold" nodeType="clickEffect">
+                                  <p:stCondLst>
+                                    <p:cond delay="0"/>
+                                  </p:stCondLst>
+                                  <p:childTnLst>
+                                    <p:set>
+                                      <p:cBhvr>
+                                        <p:cTn id="6" dur="1" fill="hold">
+                                          <p:stCondLst>
+                                            <p:cond delay="0"/>
+                                          </p:stCondLst>
+                                        </p:cTn>
+                                        <p:tgtEl>
+                                          <p:spTgt spid="3">
+                                            <p:txEl>
+                                              <p:pRg st="4" end="4"/>
+                                            </p:txEl>
+                                          </p:spTgt>
+                                        </p:tgtEl>
+                                        <p:attrNameLst>
+                                          <p:attrName>style.visibility</p:attrName>
+                                        </p:attrNameLst>
+                                      </p:cBhvr>
+                                      <p:to>
+                                        <p:strVal val="visible"/>
+                                      </p:to>
+                                    </p:set>
+                                  </p:childTnLst>
+                                </p:cTn>
+                              </p:par>
+                            </p:childTnLst>
+                          </p:cTn>
+                        </p:par>
+                      </p:childTnLst>
+                    </p:cTn>
+                  </p:par>
+                </p:childTnLst>
+              </p:cTn>
+              <p:prevCondLst>
+                <p:cond evt="onPrev" delay="0">
+                  <p:tgtEl>
+                    <p:sldTgt/>
+                  </p:tgtEl>
+                </p:cond>
+              </p:prevCondLst>
+              <p:nextCondLst>
+                <p:cond evt="onNext" delay="0">
+                  <p:tgtEl>
+                    <p:sldTgt/>
+                  </p:tgtEl>
+                </p:cond>
+              </p:nextCondLst>
+            </p:seq>
+          </p:childTnLst>
+        </p:cTn>
+      </p:par>
+    </p:tnLst>
+  </p:timing>
+</p:sld>
+</file>
+
+<file path=ppt/slides/slide16.xml><?xml version="1.0" encoding="utf-8"?>
+<p:sld xmlns:a="http://schemas.openxmlformats.org/drawingml/2006/main" xmlns:r="http://schemas.openxmlformats.org/officeDocument/2006/relationships" xmlns:p="http://schemas.openxmlformats.org/presentationml/2006/main">
+  <p:cSld>
+    <p:spTree>
+      <p:nvGrpSpPr>
+        <p:cNvPr id="1" name=""/>
+        <p:cNvGrpSpPr/>
+        <p:nvPr/>
+      </p:nvGrpSpPr>
+      <p:grpSpPr>
+        <a:xfrm>
+          <a:off x="0" y="0"/>
+          <a:ext cx="0" cy="0"/>
+          <a:chOff x="0" y="0"/>
+          <a:chExt cx="0" cy="0"/>
+        </a:xfrm>
+      </p:grpSpPr>
+      <p:sp>
+        <p:nvSpPr>
+          <p:cNvPr id="3" name="Content Placeholder 2">
+            <a:extLst>
+              <a:ext uri="{FF2B5EF4-FFF2-40B4-BE49-F238E27FC236}">
+                <a16:creationId xmlns:a16="http://schemas.microsoft.com/office/drawing/2014/main" id="{9048B7F4-855F-2416-0C93-80AC06EDB470}"/>
+              </a:ext>
+            </a:extLst>
+          </p:cNvPr>
+          <p:cNvSpPr>
+            <a:spLocks noGrp="1"/>
+          </p:cNvSpPr>
+          <p:nvPr>
+            <p:ph idx="1"/>
+          </p:nvPr>
+        </p:nvSpPr>
+        <p:spPr/>
+        <p:txBody>
+          <a:bodyPr/>
+          <a:lstStyle/>
+          <a:p>
+            <a:pPr marL="0" indent="0">
+              <a:buNone/>
+            </a:pPr>
+            <a:r>
+              <a:rPr lang="en-US" dirty="0"/>
+              <a:t>With 767 positives and 1000 total samples:</a:t>
+            </a:r>
+          </a:p>
+          <a:p>
+            <a:pPr marL="0" indent="0" algn="ctr">
+              <a:buNone/>
+            </a:pPr>
+            <a:r>
+              <a:rPr lang="en-US" dirty="0"/>
+              <a:t>Seroprevalence = 76.7% (95% CI: 74.0%, 79.3%) </a:t>
+            </a:r>
+          </a:p>
+          <a:p>
+            <a:endParaRPr lang="en-US" dirty="0"/>
+          </a:p>
+        </p:txBody>
+      </p:sp>
+      <p:sp>
+        <p:nvSpPr>
+          <p:cNvPr id="4" name="Title 1">
+            <a:extLst>
+              <a:ext uri="{FF2B5EF4-FFF2-40B4-BE49-F238E27FC236}">
+                <a16:creationId xmlns:a16="http://schemas.microsoft.com/office/drawing/2014/main" id="{38E04507-A52D-8561-9DE6-226EE3169C0F}"/>
+              </a:ext>
+            </a:extLst>
+          </p:cNvPr>
+          <p:cNvSpPr>
+            <a:spLocks noGrp="1"/>
+          </p:cNvSpPr>
+          <p:nvPr>
+            <p:ph type="title"/>
+          </p:nvPr>
+        </p:nvSpPr>
+        <p:spPr>
+          <a:xfrm>
+            <a:off x="838200" y="365125"/>
+            <a:ext cx="10515600" cy="1325563"/>
+          </a:xfrm>
+        </p:spPr>
+        <p:txBody>
+          <a:bodyPr/>
+          <a:lstStyle/>
+          <a:p>
+            <a:r>
+              <a:rPr lang="en-US" dirty="0"/>
+              <a:t>Calculating seropositivity – confidence intervals</a:t>
+            </a:r>
+          </a:p>
+        </p:txBody>
+      </p:sp>
+    </p:spTree>
+    <p:extLst>
+      <p:ext uri="{BB962C8B-B14F-4D97-AF65-F5344CB8AC3E}">
+        <p14:creationId xmlns:p14="http://schemas.microsoft.com/office/powerpoint/2010/main" val="2963041930"/>
+      </p:ext>
+    </p:extLst>
+  </p:cSld>
+  <p:clrMapOvr>
+    <a:masterClrMapping/>
+  </p:clrMapOvr>
+</p:sld>
+</file>
+
+<file path=ppt/slides/slide17.xml><?xml version="1.0" encoding="utf-8"?>
+<p:sld xmlns:a="http://schemas.openxmlformats.org/drawingml/2006/main" xmlns:r="http://schemas.openxmlformats.org/officeDocument/2006/relationships" xmlns:p="http://schemas.openxmlformats.org/presentationml/2006/main">
+  <p:cSld>
+    <p:spTree>
+      <p:nvGrpSpPr>
         <p:cNvPr id="1" name="">
           <a:extLst>
             <a:ext uri="{FF2B5EF4-FFF2-40B4-BE49-F238E27FC236}">
@@ -7260,222 +7588,6 @@
 </p:sld>
 </file>
 
-<file path=ppt/slides/slide16.xml><?xml version="1.0" encoding="utf-8"?>
-<p:sld xmlns:a="http://schemas.openxmlformats.org/drawingml/2006/main" xmlns:r="http://schemas.openxmlformats.org/officeDocument/2006/relationships" xmlns:p="http://schemas.openxmlformats.org/presentationml/2006/main">
-  <p:cSld>
-    <p:spTree>
-      <p:nvGrpSpPr>
-        <p:cNvPr id="1" name=""/>
-        <p:cNvGrpSpPr/>
-        <p:nvPr/>
-      </p:nvGrpSpPr>
-      <p:grpSpPr>
-        <a:xfrm>
-          <a:off x="0" y="0"/>
-          <a:ext cx="0" cy="0"/>
-          <a:chOff x="0" y="0"/>
-          <a:chExt cx="0" cy="0"/>
-        </a:xfrm>
-      </p:grpSpPr>
-      <p:sp>
-        <p:nvSpPr>
-          <p:cNvPr id="2" name="Title 1">
-            <a:extLst>
-              <a:ext uri="{FF2B5EF4-FFF2-40B4-BE49-F238E27FC236}">
-                <a16:creationId xmlns:a16="http://schemas.microsoft.com/office/drawing/2014/main" id="{8235AF65-ACC8-02E9-BAAA-410AD7362898}"/>
-              </a:ext>
-            </a:extLst>
-          </p:cNvPr>
-          <p:cNvSpPr>
-            <a:spLocks noGrp="1"/>
-          </p:cNvSpPr>
-          <p:nvPr>
-            <p:ph type="title"/>
-          </p:nvPr>
-        </p:nvSpPr>
-        <p:spPr>
-          <a:xfrm>
-            <a:off x="575733" y="365125"/>
-            <a:ext cx="11051823" cy="1325563"/>
-          </a:xfrm>
-        </p:spPr>
-        <p:txBody>
-          <a:bodyPr/>
-          <a:lstStyle/>
-          <a:p>
-            <a:r>
-              <a:rPr lang="en-US" dirty="0"/>
-              <a:t>Question: How do we interpret seroprevalence?</a:t>
-            </a:r>
-          </a:p>
-        </p:txBody>
-      </p:sp>
-      <p:sp>
-        <p:nvSpPr>
-          <p:cNvPr id="3" name="Content Placeholder 2">
-            <a:extLst>
-              <a:ext uri="{FF2B5EF4-FFF2-40B4-BE49-F238E27FC236}">
-                <a16:creationId xmlns:a16="http://schemas.microsoft.com/office/drawing/2014/main" id="{A3CA31CA-9D02-A267-EC10-A2016E0E86EE}"/>
-              </a:ext>
-            </a:extLst>
-          </p:cNvPr>
-          <p:cNvSpPr>
-            <a:spLocks noGrp="1"/>
-          </p:cNvSpPr>
-          <p:nvPr>
-            <p:ph idx="1"/>
-          </p:nvPr>
-        </p:nvSpPr>
-        <p:spPr/>
-        <p:txBody>
-          <a:bodyPr/>
-          <a:lstStyle/>
-          <a:p>
-            <a:r>
-              <a:rPr lang="en-US" b="1" dirty="0"/>
-              <a:t>How would we interpret seroprevalence if there is NOT a correlate of protection?</a:t>
-            </a:r>
-          </a:p>
-        </p:txBody>
-      </p:sp>
-    </p:spTree>
-    <p:extLst>
-      <p:ext uri="{BB962C8B-B14F-4D97-AF65-F5344CB8AC3E}">
-        <p14:creationId xmlns:p14="http://schemas.microsoft.com/office/powerpoint/2010/main" val="1354356339"/>
-      </p:ext>
-    </p:extLst>
-  </p:cSld>
-  <p:clrMapOvr>
-    <a:masterClrMapping/>
-  </p:clrMapOvr>
-</p:sld>
-</file>
-
-<file path=ppt/slides/slide17.xml><?xml version="1.0" encoding="utf-8"?>
-<p:sld xmlns:a="http://schemas.openxmlformats.org/drawingml/2006/main" xmlns:r="http://schemas.openxmlformats.org/officeDocument/2006/relationships" xmlns:p="http://schemas.openxmlformats.org/presentationml/2006/main">
-  <p:cSld>
-    <p:spTree>
-      <p:nvGrpSpPr>
-        <p:cNvPr id="1" name=""/>
-        <p:cNvGrpSpPr/>
-        <p:nvPr/>
-      </p:nvGrpSpPr>
-      <p:grpSpPr>
-        <a:xfrm>
-          <a:off x="0" y="0"/>
-          <a:ext cx="0" cy="0"/>
-          <a:chOff x="0" y="0"/>
-          <a:chExt cx="0" cy="0"/>
-        </a:xfrm>
-      </p:grpSpPr>
-      <p:sp>
-        <p:nvSpPr>
-          <p:cNvPr id="3" name="Content Placeholder 2">
-            <a:extLst>
-              <a:ext uri="{FF2B5EF4-FFF2-40B4-BE49-F238E27FC236}">
-                <a16:creationId xmlns:a16="http://schemas.microsoft.com/office/drawing/2014/main" id="{2E329247-2DEE-A52D-0A72-6D811C48EBB6}"/>
-              </a:ext>
-            </a:extLst>
-          </p:cNvPr>
-          <p:cNvSpPr>
-            <a:spLocks noGrp="1"/>
-          </p:cNvSpPr>
-          <p:nvPr>
-            <p:ph idx="1"/>
-          </p:nvPr>
-        </p:nvSpPr>
-        <p:spPr/>
-        <p:txBody>
-          <a:bodyPr/>
-          <a:lstStyle/>
-          <a:p>
-            <a:r>
-              <a:rPr lang="en-US" b="1" dirty="0"/>
-              <a:t>How would we interpret seroprevalence if there is NOT a correlate of protection?</a:t>
-            </a:r>
-          </a:p>
-          <a:p>
-            <a:r>
-              <a:rPr lang="en-US" dirty="0"/>
-              <a:t>For antigens in general, seroprevalence could indicate:</a:t>
-            </a:r>
-          </a:p>
-          <a:p>
-            <a:pPr lvl="1"/>
-            <a:r>
-              <a:rPr lang="en-US" dirty="0"/>
-              <a:t>Population ever exposed to pathogen or vaccine</a:t>
-            </a:r>
-          </a:p>
-          <a:p>
-            <a:pPr lvl="1"/>
-            <a:r>
-              <a:rPr lang="en-US" dirty="0"/>
-              <a:t>Population with recent infection</a:t>
-            </a:r>
-          </a:p>
-          <a:p>
-            <a:pPr lvl="1"/>
-            <a:r>
-              <a:rPr lang="en-US" dirty="0"/>
-              <a:t>Population with symptomatic infection</a:t>
-            </a:r>
-          </a:p>
-          <a:p>
-            <a:pPr lvl="1"/>
-            <a:r>
-              <a:rPr lang="en-US" dirty="0"/>
-              <a:t>Cross-reactive antibody responses</a:t>
-            </a:r>
-          </a:p>
-        </p:txBody>
-      </p:sp>
-      <p:sp>
-        <p:nvSpPr>
-          <p:cNvPr id="4" name="Title 1">
-            <a:extLst>
-              <a:ext uri="{FF2B5EF4-FFF2-40B4-BE49-F238E27FC236}">
-                <a16:creationId xmlns:a16="http://schemas.microsoft.com/office/drawing/2014/main" id="{061B93DF-0EF6-666C-28EA-BF0ECBB27CE5}"/>
-              </a:ext>
-            </a:extLst>
-          </p:cNvPr>
-          <p:cNvSpPr>
-            <a:spLocks noGrp="1"/>
-          </p:cNvSpPr>
-          <p:nvPr>
-            <p:ph type="title"/>
-          </p:nvPr>
-        </p:nvSpPr>
-        <p:spPr>
-          <a:xfrm>
-            <a:off x="575733" y="365125"/>
-            <a:ext cx="11051823" cy="1325563"/>
-          </a:xfrm>
-        </p:spPr>
-        <p:txBody>
-          <a:bodyPr/>
-          <a:lstStyle/>
-          <a:p>
-            <a:r>
-              <a:rPr lang="en-US" dirty="0"/>
-              <a:t>Question: How do we interpret seroprevalence?</a:t>
-            </a:r>
-          </a:p>
-        </p:txBody>
-      </p:sp>
-    </p:spTree>
-    <p:extLst>
-      <p:ext uri="{BB962C8B-B14F-4D97-AF65-F5344CB8AC3E}">
-        <p14:creationId xmlns:p14="http://schemas.microsoft.com/office/powerpoint/2010/main" val="242034705"/>
-      </p:ext>
-    </p:extLst>
-  </p:cSld>
-  <p:clrMapOvr>
-    <a:masterClrMapping/>
-  </p:clrMapOvr>
-</p:sld>
-</file>
-
 <file path=ppt/slides/slide18.xml><?xml version="1.0" encoding="utf-8"?>
 <p:sld xmlns:a="http://schemas.openxmlformats.org/drawingml/2006/main" xmlns:r="http://schemas.openxmlformats.org/officeDocument/2006/relationships" xmlns:p="http://schemas.openxmlformats.org/presentationml/2006/main">
   <p:cSld>
@@ -7498,6 +7610,331 @@
           <p:cNvPr id="2" name="Title 1">
             <a:extLst>
               <a:ext uri="{FF2B5EF4-FFF2-40B4-BE49-F238E27FC236}">
+                <a16:creationId xmlns:a16="http://schemas.microsoft.com/office/drawing/2014/main" id="{8235AF65-ACC8-02E9-BAAA-410AD7362898}"/>
+              </a:ext>
+            </a:extLst>
+          </p:cNvPr>
+          <p:cNvSpPr>
+            <a:spLocks noGrp="1"/>
+          </p:cNvSpPr>
+          <p:nvPr>
+            <p:ph type="title"/>
+          </p:nvPr>
+        </p:nvSpPr>
+        <p:spPr>
+          <a:xfrm>
+            <a:off x="575733" y="365125"/>
+            <a:ext cx="11051823" cy="1325563"/>
+          </a:xfrm>
+        </p:spPr>
+        <p:txBody>
+          <a:bodyPr/>
+          <a:lstStyle/>
+          <a:p>
+            <a:r>
+              <a:rPr lang="en-US" dirty="0"/>
+              <a:t>Question: How do we interpret seroprevalence?</a:t>
+            </a:r>
+          </a:p>
+        </p:txBody>
+      </p:sp>
+      <p:sp>
+        <p:nvSpPr>
+          <p:cNvPr id="3" name="Content Placeholder 2">
+            <a:extLst>
+              <a:ext uri="{FF2B5EF4-FFF2-40B4-BE49-F238E27FC236}">
+                <a16:creationId xmlns:a16="http://schemas.microsoft.com/office/drawing/2014/main" id="{A3CA31CA-9D02-A267-EC10-A2016E0E86EE}"/>
+              </a:ext>
+            </a:extLst>
+          </p:cNvPr>
+          <p:cNvSpPr>
+            <a:spLocks noGrp="1"/>
+          </p:cNvSpPr>
+          <p:nvPr>
+            <p:ph idx="1"/>
+          </p:nvPr>
+        </p:nvSpPr>
+        <p:spPr/>
+        <p:txBody>
+          <a:bodyPr/>
+          <a:lstStyle/>
+          <a:p>
+            <a:r>
+              <a:rPr lang="en-US" b="1" dirty="0"/>
+              <a:t>How would we interpret seroprevalence if there is NOT a correlate of protection?</a:t>
+            </a:r>
+          </a:p>
+        </p:txBody>
+      </p:sp>
+    </p:spTree>
+    <p:extLst>
+      <p:ext uri="{BB962C8B-B14F-4D97-AF65-F5344CB8AC3E}">
+        <p14:creationId xmlns:p14="http://schemas.microsoft.com/office/powerpoint/2010/main" val="1354356339"/>
+      </p:ext>
+    </p:extLst>
+  </p:cSld>
+  <p:clrMapOvr>
+    <a:masterClrMapping/>
+  </p:clrMapOvr>
+</p:sld>
+</file>
+
+<file path=ppt/slides/slide19.xml><?xml version="1.0" encoding="utf-8"?>
+<p:sld xmlns:a="http://schemas.openxmlformats.org/drawingml/2006/main" xmlns:r="http://schemas.openxmlformats.org/officeDocument/2006/relationships" xmlns:p="http://schemas.openxmlformats.org/presentationml/2006/main">
+  <p:cSld>
+    <p:spTree>
+      <p:nvGrpSpPr>
+        <p:cNvPr id="1" name=""/>
+        <p:cNvGrpSpPr/>
+        <p:nvPr/>
+      </p:nvGrpSpPr>
+      <p:grpSpPr>
+        <a:xfrm>
+          <a:off x="0" y="0"/>
+          <a:ext cx="0" cy="0"/>
+          <a:chOff x="0" y="0"/>
+          <a:chExt cx="0" cy="0"/>
+        </a:xfrm>
+      </p:grpSpPr>
+      <p:sp>
+        <p:nvSpPr>
+          <p:cNvPr id="3" name="Content Placeholder 2">
+            <a:extLst>
+              <a:ext uri="{FF2B5EF4-FFF2-40B4-BE49-F238E27FC236}">
+                <a16:creationId xmlns:a16="http://schemas.microsoft.com/office/drawing/2014/main" id="{2E329247-2DEE-A52D-0A72-6D811C48EBB6}"/>
+              </a:ext>
+            </a:extLst>
+          </p:cNvPr>
+          <p:cNvSpPr>
+            <a:spLocks noGrp="1"/>
+          </p:cNvSpPr>
+          <p:nvPr>
+            <p:ph idx="1"/>
+          </p:nvPr>
+        </p:nvSpPr>
+        <p:spPr/>
+        <p:txBody>
+          <a:bodyPr/>
+          <a:lstStyle/>
+          <a:p>
+            <a:r>
+              <a:rPr lang="en-US" b="1" dirty="0"/>
+              <a:t>How would we interpret seroprevalence if there is NOT a correlate of protection?</a:t>
+            </a:r>
+          </a:p>
+          <a:p>
+            <a:r>
+              <a:rPr lang="en-US" dirty="0"/>
+              <a:t>For antigens in general, seroprevalence could indicate:</a:t>
+            </a:r>
+          </a:p>
+          <a:p>
+            <a:pPr lvl="1"/>
+            <a:r>
+              <a:rPr lang="en-US" dirty="0"/>
+              <a:t>Population ever exposed to pathogen or vaccine</a:t>
+            </a:r>
+          </a:p>
+          <a:p>
+            <a:pPr lvl="1"/>
+            <a:r>
+              <a:rPr lang="en-US" dirty="0"/>
+              <a:t>Population with recent infection</a:t>
+            </a:r>
+          </a:p>
+          <a:p>
+            <a:pPr lvl="1"/>
+            <a:r>
+              <a:rPr lang="en-US" dirty="0"/>
+              <a:t>Population with symptomatic infection</a:t>
+            </a:r>
+          </a:p>
+          <a:p>
+            <a:pPr lvl="1"/>
+            <a:r>
+              <a:rPr lang="en-US" dirty="0"/>
+              <a:t>Cross-reactive antibody responses</a:t>
+            </a:r>
+          </a:p>
+        </p:txBody>
+      </p:sp>
+      <p:sp>
+        <p:nvSpPr>
+          <p:cNvPr id="4" name="Title 1">
+            <a:extLst>
+              <a:ext uri="{FF2B5EF4-FFF2-40B4-BE49-F238E27FC236}">
+                <a16:creationId xmlns:a16="http://schemas.microsoft.com/office/drawing/2014/main" id="{061B93DF-0EF6-666C-28EA-BF0ECBB27CE5}"/>
+              </a:ext>
+            </a:extLst>
+          </p:cNvPr>
+          <p:cNvSpPr>
+            <a:spLocks noGrp="1"/>
+          </p:cNvSpPr>
+          <p:nvPr>
+            <p:ph type="title"/>
+          </p:nvPr>
+        </p:nvSpPr>
+        <p:spPr>
+          <a:xfrm>
+            <a:off x="575733" y="365125"/>
+            <a:ext cx="11051823" cy="1325563"/>
+          </a:xfrm>
+        </p:spPr>
+        <p:txBody>
+          <a:bodyPr/>
+          <a:lstStyle/>
+          <a:p>
+            <a:r>
+              <a:rPr lang="en-US" dirty="0"/>
+              <a:t>Question: How do we interpret seroprevalence?</a:t>
+            </a:r>
+          </a:p>
+        </p:txBody>
+      </p:sp>
+    </p:spTree>
+    <p:extLst>
+      <p:ext uri="{BB962C8B-B14F-4D97-AF65-F5344CB8AC3E}">
+        <p14:creationId xmlns:p14="http://schemas.microsoft.com/office/powerpoint/2010/main" val="242034705"/>
+      </p:ext>
+    </p:extLst>
+  </p:cSld>
+  <p:clrMapOvr>
+    <a:masterClrMapping/>
+  </p:clrMapOvr>
+</p:sld>
+</file>
+
+<file path=ppt/slides/slide2.xml><?xml version="1.0" encoding="utf-8"?>
+<p:sld xmlns:a="http://schemas.openxmlformats.org/drawingml/2006/main" xmlns:r="http://schemas.openxmlformats.org/officeDocument/2006/relationships" xmlns:p="http://schemas.openxmlformats.org/presentationml/2006/main">
+  <p:cSld>
+    <p:spTree>
+      <p:nvGrpSpPr>
+        <p:cNvPr id="1" name=""/>
+        <p:cNvGrpSpPr/>
+        <p:nvPr/>
+      </p:nvGrpSpPr>
+      <p:grpSpPr>
+        <a:xfrm>
+          <a:off x="0" y="0"/>
+          <a:ext cx="0" cy="0"/>
+          <a:chOff x="0" y="0"/>
+          <a:chExt cx="0" cy="0"/>
+        </a:xfrm>
+      </p:grpSpPr>
+      <p:sp>
+        <p:nvSpPr>
+          <p:cNvPr id="2" name="Title 1">
+            <a:extLst>
+              <a:ext uri="{FF2B5EF4-FFF2-40B4-BE49-F238E27FC236}">
+                <a16:creationId xmlns:a16="http://schemas.microsoft.com/office/drawing/2014/main" id="{2B9D4F15-62EA-517A-97D7-3C917C7F4C50}"/>
+              </a:ext>
+            </a:extLst>
+          </p:cNvPr>
+          <p:cNvSpPr>
+            <a:spLocks noGrp="1"/>
+          </p:cNvSpPr>
+          <p:nvPr>
+            <p:ph type="title"/>
+          </p:nvPr>
+        </p:nvSpPr>
+        <p:spPr/>
+        <p:txBody>
+          <a:bodyPr/>
+          <a:lstStyle/>
+          <a:p>
+            <a:r>
+              <a:rPr lang="en-US" dirty="0"/>
+              <a:t>Lecture outline: </a:t>
+            </a:r>
+          </a:p>
+        </p:txBody>
+      </p:sp>
+      <p:sp>
+        <p:nvSpPr>
+          <p:cNvPr id="3" name="Content Placeholder 2">
+            <a:extLst>
+              <a:ext uri="{FF2B5EF4-FFF2-40B4-BE49-F238E27FC236}">
+                <a16:creationId xmlns:a16="http://schemas.microsoft.com/office/drawing/2014/main" id="{26B03998-8D19-413F-D557-FDE476559A1C}"/>
+              </a:ext>
+            </a:extLst>
+          </p:cNvPr>
+          <p:cNvSpPr>
+            <a:spLocks noGrp="1"/>
+          </p:cNvSpPr>
+          <p:nvPr>
+            <p:ph idx="1"/>
+          </p:nvPr>
+        </p:nvSpPr>
+        <p:spPr>
+          <a:xfrm>
+            <a:off x="1135380" y="1814195"/>
+            <a:ext cx="7597140" cy="4351338"/>
+          </a:xfrm>
+        </p:spPr>
+        <p:txBody>
+          <a:bodyPr/>
+          <a:lstStyle/>
+          <a:p>
+            <a:r>
+              <a:rPr lang="en-US" dirty="0"/>
+              <a:t>Data visualization</a:t>
+            </a:r>
+          </a:p>
+          <a:p>
+            <a:r>
+              <a:rPr lang="en-US" dirty="0"/>
+              <a:t>Why binarize data? </a:t>
+            </a:r>
+          </a:p>
+          <a:p>
+            <a:r>
+              <a:rPr lang="en-US" dirty="0"/>
+              <a:t>Calculating seroprevalence from a cutoff</a:t>
+            </a:r>
+          </a:p>
+          <a:p>
+            <a:r>
+              <a:rPr lang="en-US" dirty="0"/>
+              <a:t>Selecting controls</a:t>
+            </a:r>
+          </a:p>
+        </p:txBody>
+      </p:sp>
+    </p:spTree>
+    <p:extLst>
+      <p:ext uri="{BB962C8B-B14F-4D97-AF65-F5344CB8AC3E}">
+        <p14:creationId xmlns:p14="http://schemas.microsoft.com/office/powerpoint/2010/main" val="86817123"/>
+      </p:ext>
+    </p:extLst>
+  </p:cSld>
+  <p:clrMapOvr>
+    <a:masterClrMapping/>
+  </p:clrMapOvr>
+</p:sld>
+</file>
+
+<file path=ppt/slides/slide20.xml><?xml version="1.0" encoding="utf-8"?>
+<p:sld xmlns:a="http://schemas.openxmlformats.org/drawingml/2006/main" xmlns:r="http://schemas.openxmlformats.org/officeDocument/2006/relationships" xmlns:p="http://schemas.openxmlformats.org/presentationml/2006/main">
+  <p:cSld>
+    <p:spTree>
+      <p:nvGrpSpPr>
+        <p:cNvPr id="1" name=""/>
+        <p:cNvGrpSpPr/>
+        <p:nvPr/>
+      </p:nvGrpSpPr>
+      <p:grpSpPr>
+        <a:xfrm>
+          <a:off x="0" y="0"/>
+          <a:ext cx="0" cy="0"/>
+          <a:chOff x="0" y="0"/>
+          <a:chExt cx="0" cy="0"/>
+        </a:xfrm>
+      </p:grpSpPr>
+      <p:sp>
+        <p:nvSpPr>
+          <p:cNvPr id="2" name="Title 1">
+            <a:extLst>
+              <a:ext uri="{FF2B5EF4-FFF2-40B4-BE49-F238E27FC236}">
                 <a16:creationId xmlns:a16="http://schemas.microsoft.com/office/drawing/2014/main" id="{F73C67F2-F3E5-A50F-A7C5-2EF0A34C9F21}"/>
               </a:ext>
             </a:extLst>
@@ -7646,7 +8083,7 @@
 </p:sld>
 </file>
 
-<file path=ppt/slides/slide19.xml><?xml version="1.0" encoding="utf-8"?>
+<file path=ppt/slides/slide21.xml><?xml version="1.0" encoding="utf-8"?>
 <p:sld xmlns:a="http://schemas.openxmlformats.org/drawingml/2006/main" xmlns:r="http://schemas.openxmlformats.org/officeDocument/2006/relationships" xmlns:p="http://schemas.openxmlformats.org/presentationml/2006/main">
   <p:cSld>
     <p:spTree>
@@ -7779,7 +8216,7 @@
 </p:sld>
 </file>
 
-<file path=ppt/slides/slide2.xml><?xml version="1.0" encoding="utf-8"?>
+<file path=ppt/slides/slide22.xml><?xml version="1.0" encoding="utf-8"?>
 <p:sld xmlns:a="http://schemas.openxmlformats.org/drawingml/2006/main" xmlns:r="http://schemas.openxmlformats.org/officeDocument/2006/relationships" xmlns:p="http://schemas.openxmlformats.org/presentationml/2006/main">
   <p:cSld>
     <p:spTree>
@@ -7801,115 +8238,6 @@
           <p:cNvPr id="2" name="Title 1">
             <a:extLst>
               <a:ext uri="{FF2B5EF4-FFF2-40B4-BE49-F238E27FC236}">
-                <a16:creationId xmlns:a16="http://schemas.microsoft.com/office/drawing/2014/main" id="{2B9D4F15-62EA-517A-97D7-3C917C7F4C50}"/>
-              </a:ext>
-            </a:extLst>
-          </p:cNvPr>
-          <p:cNvSpPr>
-            <a:spLocks noGrp="1"/>
-          </p:cNvSpPr>
-          <p:nvPr>
-            <p:ph type="title"/>
-          </p:nvPr>
-        </p:nvSpPr>
-        <p:spPr/>
-        <p:txBody>
-          <a:bodyPr/>
-          <a:lstStyle/>
-          <a:p>
-            <a:r>
-              <a:rPr lang="en-US" dirty="0"/>
-              <a:t>Lecture outline: </a:t>
-            </a:r>
-          </a:p>
-        </p:txBody>
-      </p:sp>
-      <p:sp>
-        <p:nvSpPr>
-          <p:cNvPr id="3" name="Content Placeholder 2">
-            <a:extLst>
-              <a:ext uri="{FF2B5EF4-FFF2-40B4-BE49-F238E27FC236}">
-                <a16:creationId xmlns:a16="http://schemas.microsoft.com/office/drawing/2014/main" id="{26B03998-8D19-413F-D557-FDE476559A1C}"/>
-              </a:ext>
-            </a:extLst>
-          </p:cNvPr>
-          <p:cNvSpPr>
-            <a:spLocks noGrp="1"/>
-          </p:cNvSpPr>
-          <p:nvPr>
-            <p:ph idx="1"/>
-          </p:nvPr>
-        </p:nvSpPr>
-        <p:spPr>
-          <a:xfrm>
-            <a:off x="1135380" y="1814195"/>
-            <a:ext cx="7597140" cy="4351338"/>
-          </a:xfrm>
-        </p:spPr>
-        <p:txBody>
-          <a:bodyPr/>
-          <a:lstStyle/>
-          <a:p>
-            <a:r>
-              <a:rPr lang="en-US" dirty="0"/>
-              <a:t>Data visualization</a:t>
-            </a:r>
-          </a:p>
-          <a:p>
-            <a:r>
-              <a:rPr lang="en-US" dirty="0"/>
-              <a:t>Why binarize data? </a:t>
-            </a:r>
-          </a:p>
-          <a:p>
-            <a:r>
-              <a:rPr lang="en-US" dirty="0"/>
-              <a:t>Calculating seroprevalence from a cutoff</a:t>
-            </a:r>
-          </a:p>
-          <a:p>
-            <a:r>
-              <a:rPr lang="en-US" dirty="0"/>
-              <a:t>Selecting controls</a:t>
-            </a:r>
-          </a:p>
-        </p:txBody>
-      </p:sp>
-    </p:spTree>
-    <p:extLst>
-      <p:ext uri="{BB962C8B-B14F-4D97-AF65-F5344CB8AC3E}">
-        <p14:creationId xmlns:p14="http://schemas.microsoft.com/office/powerpoint/2010/main" val="86817123"/>
-      </p:ext>
-    </p:extLst>
-  </p:cSld>
-  <p:clrMapOvr>
-    <a:masterClrMapping/>
-  </p:clrMapOvr>
-</p:sld>
-</file>
-
-<file path=ppt/slides/slide20.xml><?xml version="1.0" encoding="utf-8"?>
-<p:sld xmlns:a="http://schemas.openxmlformats.org/drawingml/2006/main" xmlns:r="http://schemas.openxmlformats.org/officeDocument/2006/relationships" xmlns:p="http://schemas.openxmlformats.org/presentationml/2006/main">
-  <p:cSld>
-    <p:spTree>
-      <p:nvGrpSpPr>
-        <p:cNvPr id="1" name=""/>
-        <p:cNvGrpSpPr/>
-        <p:nvPr/>
-      </p:nvGrpSpPr>
-      <p:grpSpPr>
-        <a:xfrm>
-          <a:off x="0" y="0"/>
-          <a:ext cx="0" cy="0"/>
-          <a:chOff x="0" y="0"/>
-          <a:chExt cx="0" cy="0"/>
-        </a:xfrm>
-      </p:grpSpPr>
-      <p:sp>
-        <p:nvSpPr>
-          <p:cNvPr id="2" name="Title 1">
-            <a:extLst>
-              <a:ext uri="{FF2B5EF4-FFF2-40B4-BE49-F238E27FC236}">
                 <a16:creationId xmlns:a16="http://schemas.microsoft.com/office/drawing/2014/main" id="{A9218A3A-1137-C5FC-BF5F-70B892ADB326}"/>
               </a:ext>
             </a:extLst>
@@ -8006,7 +8334,7 @@
 </p:sld>
 </file>
 
-<file path=ppt/slides/slide21.xml><?xml version="1.0" encoding="utf-8"?>
+<file path=ppt/slides/slide23.xml><?xml version="1.0" encoding="utf-8"?>
 <p:sld xmlns:a="http://schemas.openxmlformats.org/drawingml/2006/main" xmlns:r="http://schemas.openxmlformats.org/officeDocument/2006/relationships" xmlns:p="http://schemas.openxmlformats.org/presentationml/2006/main">
   <p:cSld>
     <p:spTree>
@@ -8187,7 +8515,7 @@
 </p:sld>
 </file>
 
-<file path=ppt/slides/slide22.xml><?xml version="1.0" encoding="utf-8"?>
+<file path=ppt/slides/slide24.xml><?xml version="1.0" encoding="utf-8"?>
 <p:sld xmlns:a="http://schemas.openxmlformats.org/drawingml/2006/main" xmlns:r="http://schemas.openxmlformats.org/officeDocument/2006/relationships" xmlns:p="http://schemas.openxmlformats.org/presentationml/2006/main">
   <p:cSld>
     <p:spTree>
@@ -8287,7 +8615,7 @@
 </p:sld>
 </file>
 
-<file path=ppt/slides/slide23.xml><?xml version="1.0" encoding="utf-8"?>
+<file path=ppt/slides/slide25.xml><?xml version="1.0" encoding="utf-8"?>
 <p:sld xmlns:a="http://schemas.openxmlformats.org/drawingml/2006/main" xmlns:r="http://schemas.openxmlformats.org/officeDocument/2006/relationships" xmlns:p="http://schemas.openxmlformats.org/presentationml/2006/main">
   <p:cSld>
     <p:spTree>
@@ -8467,7 +8795,7 @@
 </p:sld>
 </file>
 
-<file path=ppt/slides/slide24.xml><?xml version="1.0" encoding="utf-8"?>
+<file path=ppt/slides/slide26.xml><?xml version="1.0" encoding="utf-8"?>
 <p:sld xmlns:a="http://schemas.openxmlformats.org/drawingml/2006/main" xmlns:r="http://schemas.openxmlformats.org/officeDocument/2006/relationships" xmlns:p="http://schemas.openxmlformats.org/presentationml/2006/main">
   <p:cSld>
     <p:spTree>
@@ -8676,7 +9004,7 @@
 </p:sld>
 </file>
 
-<file path=ppt/slides/slide25.xml><?xml version="1.0" encoding="utf-8"?>
+<file path=ppt/slides/slide27.xml><?xml version="1.0" encoding="utf-8"?>
 <p:sld xmlns:a="http://schemas.openxmlformats.org/drawingml/2006/main" xmlns:r="http://schemas.openxmlformats.org/officeDocument/2006/relationships" xmlns:p="http://schemas.openxmlformats.org/presentationml/2006/main">
   <p:cSld>
     <p:spTree>
@@ -8821,7 +9149,7 @@
 </p:sld>
 </file>
 
-<file path=ppt/slides/slide26.xml><?xml version="1.0" encoding="utf-8"?>
+<file path=ppt/slides/slide28.xml><?xml version="1.0" encoding="utf-8"?>
 <p:sld xmlns:a="http://schemas.openxmlformats.org/drawingml/2006/main" xmlns:r="http://schemas.openxmlformats.org/officeDocument/2006/relationships" xmlns:p="http://schemas.openxmlformats.org/presentationml/2006/main">
   <p:cSld>
     <p:spTree>

</xml_diff>

<commit_message>
minor changes to lectures 1 3 4
</commit_message>
<xml_diff>
--- a/Lecture 3/Lecture 3 draft v2.pptx
+++ b/Lecture 3/Lecture 3 draft v2.pptx
@@ -208,12 +208,37 @@
 <p1510:revInfo xmlns:a="http://schemas.openxmlformats.org/drawingml/2006/main" xmlns:r="http://schemas.openxmlformats.org/officeDocument/2006/relationships" xmlns:p1510="http://schemas.microsoft.com/office/powerpoint/2015/10/main">
   <p1510:revLst>
     <p1510:client id="{353A459F-1326-E646-9951-1A5C678B88AF}" v="863" dt="2025-05-20T05:55:19.009"/>
+    <p1510:client id="{4211DB1D-9E41-C449-90FF-CA878146CA22}" v="204" dt="2025-05-20T06:47:31.940"/>
   </p1510:revLst>
 </p1510:revInfo>
 </file>
 
 <file path=ppt/changesInfos/changesInfo1.xml><?xml version="1.0" encoding="utf-8"?>
 <pc:chgInfo xmlns:a="http://schemas.openxmlformats.org/drawingml/2006/main" xmlns:r="http://schemas.openxmlformats.org/officeDocument/2006/relationships" xmlns:ac="http://schemas.microsoft.com/office/drawing/2013/main/command" xmlns:pc="http://schemas.microsoft.com/office/powerpoint/2013/main/command">
+  <pc:docChgLst>
+    <pc:chgData name="Berube, Sophie" userId="42056e48-058a-47b6-8100-9fca35c7e183" providerId="ADAL" clId="{4211DB1D-9E41-C449-90FF-CA878146CA22}"/>
+    <pc:docChg chg="custSel modSld">
+      <pc:chgData name="Berube, Sophie" userId="42056e48-058a-47b6-8100-9fca35c7e183" providerId="ADAL" clId="{4211DB1D-9E41-C449-90FF-CA878146CA22}" dt="2025-05-20T06:47:31.940" v="206" actId="20577"/>
+      <pc:docMkLst>
+        <pc:docMk/>
+      </pc:docMkLst>
+      <pc:sldChg chg="modSp mod">
+        <pc:chgData name="Berube, Sophie" userId="42056e48-058a-47b6-8100-9fca35c7e183" providerId="ADAL" clId="{4211DB1D-9E41-C449-90FF-CA878146CA22}" dt="2025-05-20T06:47:31.940" v="206" actId="20577"/>
+        <pc:sldMkLst>
+          <pc:docMk/>
+          <pc:sldMk cId="980664946" sldId="309"/>
+        </pc:sldMkLst>
+        <pc:spChg chg="mod">
+          <ac:chgData name="Berube, Sophie" userId="42056e48-058a-47b6-8100-9fca35c7e183" providerId="ADAL" clId="{4211DB1D-9E41-C449-90FF-CA878146CA22}" dt="2025-05-20T06:47:31.940" v="206" actId="20577"/>
+          <ac:spMkLst>
+            <pc:docMk/>
+            <pc:sldMk cId="980664946" sldId="309"/>
+            <ac:spMk id="3" creationId="{BDC9B94E-699B-165F-04D9-613EE637E3F0}"/>
+          </ac:spMkLst>
+        </pc:spChg>
+      </pc:sldChg>
+    </pc:docChg>
+  </pc:docChgLst>
   <pc:docChgLst>
     <pc:chgData name="Sonia Tara Hegde" userId="d93a2558-a889-4521-bcb4-6ed3fce9e012" providerId="ADAL" clId="{353A459F-1326-E646-9951-1A5C678B88AF}"/>
     <pc:docChg chg="undo custSel addSld delSld modSld modSection">
@@ -9484,7 +9509,7 @@
         </p:spPr>
         <p:txBody>
           <a:bodyPr>
-            <a:normAutofit fontScale="92500" lnSpcReduction="10000"/>
+            <a:normAutofit fontScale="92500" lnSpcReduction="20000"/>
           </a:bodyPr>
           <a:lstStyle/>
           <a:p>
@@ -9496,7 +9521,15 @@
           <a:p>
             <a:r>
               <a:rPr lang="en-US" dirty="0"/>
-              <a:t>Estimating a 95% confidence interval means we are 95% confident the range will include the true population-level seroprevalence.</a:t>
+              <a:t>Estimating a 95% confidence interval means that in 95 out of 100 calculations of seroprevalence from the same source population using 1000 individuals</a:t>
+            </a:r>
+            <a:r>
+              <a:rPr lang="en-US"/>
+              <a:t>, the </a:t>
+            </a:r>
+            <a:r>
+              <a:rPr lang="en-US" dirty="0"/>
+              <a:t>range will include the true population-level seroprevalence.</a:t>
             </a:r>
           </a:p>
           <a:p>

</xml_diff>